<commit_message>
substituindo arquivo com erro no nome
</commit_message>
<xml_diff>
--- a/AI-AGENTS.pptx
+++ b/AI-AGENTS.pptx
@@ -250,7 +250,7 @@
             <a:pPr rtl="0"/>
             <a:fld id="{0FE75C96-6954-4169-86C5-0628F3F633E6}" type="datetime1">
               <a:rPr lang="pt-BR" smtClean="0"/>
-              <a:t>07/08/2024</a:t>
+              <a:t>09/08/2024</a:t>
             </a:fld>
             <a:endParaRPr lang="pt-BR" dirty="0"/>
           </a:p>
@@ -432,7 +432,7 @@
             <a:fld id="{0E575291-0B95-4A00-9C6C-54CBD6EF268B}" type="datetime1">
               <a:rPr lang="pt-BR" smtClean="0"/>
               <a:pPr/>
-              <a:t>07/08/2024</a:t>
+              <a:t>09/08/2024</a:t>
             </a:fld>
             <a:endParaRPr lang="pt-BR" dirty="0"/>
           </a:p>
@@ -16819,8 +16819,8 @@
           <a:p>
             <a:pPr rtl="0"/>
             <a:r>
-              <a:rPr lang="pt-BR"/>
-              <a:t>Lara Cardoso</a:t>
+              <a:rPr lang="pt-BR" b="1" dirty="0"/>
+              <a:t>Rodrigo Viannini</a:t>
             </a:r>
           </a:p>
         </p:txBody>
@@ -19725,25 +19725,6 @@
 </file>
 
 <file path=customXml/item1.xml><?xml version="1.0" encoding="utf-8"?>
-<p:properties xmlns:p="http://schemas.microsoft.com/office/2006/metadata/properties" xmlns:xsi="http://www.w3.org/2001/XMLSchema-instance" xmlns:pc="http://schemas.microsoft.com/office/infopath/2007/PartnerControls">
-  <documentManagement>
-    <_ip_UnifiedCompliancePolicyUIAction xmlns="http://schemas.microsoft.com/sharepoint/v3" xsi:nil="true"/>
-    <Image xmlns="71af3243-3dd4-4a8d-8c0d-dd76da1f02a5">
-      <Url xsi:nil="true"/>
-      <Description xsi:nil="true"/>
-    </Image>
-    <Status xmlns="71af3243-3dd4-4a8d-8c0d-dd76da1f02a5">Not started</Status>
-    <_ip_UnifiedCompliancePolicyProperties xmlns="http://schemas.microsoft.com/sharepoint/v3" xsi:nil="true"/>
-    <ImageTagsTaxHTField xmlns="71af3243-3dd4-4a8d-8c0d-dd76da1f02a5">
-      <Terms xmlns="http://schemas.microsoft.com/office/infopath/2007/PartnerControls"/>
-    </ImageTagsTaxHTField>
-    <TaxCatchAll xmlns="230e9df3-be65-4c73-a93b-d1236ebd677e"/>
-    <MediaServiceKeyPoints xmlns="71af3243-3dd4-4a8d-8c0d-dd76da1f02a5" xsi:nil="true"/>
-  </documentManagement>
-</p:properties>
-</file>
-
-<file path=customXml/item2.xml><?xml version="1.0" encoding="utf-8"?>
 <ct:contentTypeSchema xmlns:ct="http://schemas.microsoft.com/office/2006/metadata/contentType" xmlns:ma="http://schemas.microsoft.com/office/2006/metadata/properties/metaAttributes" ct:_="" ma:_="" ma:contentTypeName="Document" ma:contentTypeID="0x01010079F111ED35F8CC479449609E8A0923A6" ma:contentTypeVersion="20" ma:contentTypeDescription="Create a new document." ma:contentTypeScope="" ma:versionID="1267097ee5f5874adfcc408041ae252e">
   <xsd:schema xmlns:xsd="http://www.w3.org/2001/XMLSchema" xmlns:xs="http://www.w3.org/2001/XMLSchema" xmlns:p="http://schemas.microsoft.com/office/2006/metadata/properties" xmlns:ns1="http://schemas.microsoft.com/sharepoint/v3" xmlns:ns2="71af3243-3dd4-4a8d-8c0d-dd76da1f02a5" xmlns:ns3="16c05727-aa75-4e4a-9b5f-8a80a1165891" xmlns:ns4="230e9df3-be65-4c73-a93b-d1236ebd677e" targetNamespace="http://schemas.microsoft.com/office/2006/metadata/properties" ma:root="true" ma:fieldsID="395891a93df65b14727750f2c06c306c" ns1:_="" ns2:_="" ns3:_="" ns4:_="">
     <xsd:import namespace="http://schemas.microsoft.com/sharepoint/v3"/>
@@ -20019,6 +20000,25 @@
 </ct:contentTypeSchema>
 </file>
 
+<file path=customXml/item2.xml><?xml version="1.0" encoding="utf-8"?>
+<p:properties xmlns:p="http://schemas.microsoft.com/office/2006/metadata/properties" xmlns:xsi="http://www.w3.org/2001/XMLSchema-instance" xmlns:pc="http://schemas.microsoft.com/office/infopath/2007/PartnerControls">
+  <documentManagement>
+    <_ip_UnifiedCompliancePolicyUIAction xmlns="http://schemas.microsoft.com/sharepoint/v3" xsi:nil="true"/>
+    <Image xmlns="71af3243-3dd4-4a8d-8c0d-dd76da1f02a5">
+      <Url xsi:nil="true"/>
+      <Description xsi:nil="true"/>
+    </Image>
+    <Status xmlns="71af3243-3dd4-4a8d-8c0d-dd76da1f02a5">Not started</Status>
+    <_ip_UnifiedCompliancePolicyProperties xmlns="http://schemas.microsoft.com/sharepoint/v3" xsi:nil="true"/>
+    <ImageTagsTaxHTField xmlns="71af3243-3dd4-4a8d-8c0d-dd76da1f02a5">
+      <Terms xmlns="http://schemas.microsoft.com/office/infopath/2007/PartnerControls"/>
+    </ImageTagsTaxHTField>
+    <TaxCatchAll xmlns="230e9df3-be65-4c73-a93b-d1236ebd677e"/>
+    <MediaServiceKeyPoints xmlns="71af3243-3dd4-4a8d-8c0d-dd76da1f02a5" xsi:nil="true"/>
+  </documentManagement>
+</p:properties>
+</file>
+
 <file path=customXml/item3.xml><?xml version="1.0" encoding="utf-8"?>
 <?mso-contentType ?>
 <FormTemplates xmlns="http://schemas.microsoft.com/sharepoint/v3/contenttype/forms">
@@ -20029,18 +20029,6 @@
 </file>
 
 <file path=customXml/itemProps1.xml><?xml version="1.0" encoding="utf-8"?>
-<ds:datastoreItem xmlns:ds="http://schemas.openxmlformats.org/officeDocument/2006/customXml" ds:itemID="{7F97B18F-50BC-4F30-8373-93489E845F83}">
-  <ds:schemaRefs>
-    <ds:schemaRef ds:uri="http://schemas.microsoft.com/office/2006/metadata/properties"/>
-    <ds:schemaRef ds:uri="http://schemas.microsoft.com/office/infopath/2007/PartnerControls"/>
-    <ds:schemaRef ds:uri="http://schemas.microsoft.com/sharepoint/v3"/>
-    <ds:schemaRef ds:uri="71af3243-3dd4-4a8d-8c0d-dd76da1f02a5"/>
-    <ds:schemaRef ds:uri="230e9df3-be65-4c73-a93b-d1236ebd677e"/>
-  </ds:schemaRefs>
-</ds:datastoreItem>
-</file>
-
-<file path=customXml/itemProps2.xml><?xml version="1.0" encoding="utf-8"?>
 <ds:datastoreItem xmlns:ds="http://schemas.openxmlformats.org/officeDocument/2006/customXml" ds:itemID="{64CF2EF3-001F-4BE9-81B3-86ECBBF9425F}">
   <ds:schemaRefs>
     <ds:schemaRef ds:uri="http://schemas.microsoft.com/office/2006/metadata/contentType"/>
@@ -20061,6 +20049,18 @@
 </ds:datastoreItem>
 </file>
 
+<file path=customXml/itemProps2.xml><?xml version="1.0" encoding="utf-8"?>
+<ds:datastoreItem xmlns:ds="http://schemas.openxmlformats.org/officeDocument/2006/customXml" ds:itemID="{7F97B18F-50BC-4F30-8373-93489E845F83}">
+  <ds:schemaRefs>
+    <ds:schemaRef ds:uri="http://schemas.microsoft.com/office/2006/metadata/properties"/>
+    <ds:schemaRef ds:uri="http://schemas.microsoft.com/office/infopath/2007/PartnerControls"/>
+    <ds:schemaRef ds:uri="http://schemas.microsoft.com/sharepoint/v3"/>
+    <ds:schemaRef ds:uri="71af3243-3dd4-4a8d-8c0d-dd76da1f02a5"/>
+    <ds:schemaRef ds:uri="230e9df3-be65-4c73-a93b-d1236ebd677e"/>
+  </ds:schemaRefs>
+</ds:datastoreItem>
+</file>
+
 <file path=customXml/itemProps3.xml><?xml version="1.0" encoding="utf-8"?>
 <ds:datastoreItem xmlns:ds="http://schemas.openxmlformats.org/officeDocument/2006/customXml" ds:itemID="{42BC90D6-94CF-42F7-AAC4-9CF6824C54D5}">
   <ds:schemaRefs>

</xml_diff>